<commit_message>
debug fix po prezentaci
</commit_message>
<xml_diff>
--- a/TrackApp.pptx
+++ b/TrackApp.pptx
@@ -108,6 +108,11 @@
       </a:defRPr>
     </a:lvl9pPr>
   </p:defaultTextStyle>
+  <p:extLst>
+    <p:ext uri="{EFAFB233-063F-42B5-8137-9DF3F51BA10A}">
+      <p15:sldGuideLst xmlns:p15="http://schemas.microsoft.com/office/powerpoint/2012/main"/>
+    </p:ext>
+  </p:extLst>
 </p:presentation>
 </file>
 
@@ -258,7 +263,7 @@
           <a:p>
             <a:fld id="{C4EE0309-0ACD-46C5-9331-0350AA5DD206}" type="datetimeFigureOut">
               <a:rPr lang="cs-CZ" smtClean="0"/>
-              <a:t>17.01.2022</a:t>
+              <a:t>18.01.2022</a:t>
             </a:fld>
             <a:endParaRPr lang="cs-CZ"/>
           </a:p>
@@ -456,7 +461,7 @@
           <a:p>
             <a:fld id="{C4EE0309-0ACD-46C5-9331-0350AA5DD206}" type="datetimeFigureOut">
               <a:rPr lang="cs-CZ" smtClean="0"/>
-              <a:t>17.01.2022</a:t>
+              <a:t>18.01.2022</a:t>
             </a:fld>
             <a:endParaRPr lang="cs-CZ"/>
           </a:p>
@@ -664,7 +669,7 @@
           <a:p>
             <a:fld id="{C4EE0309-0ACD-46C5-9331-0350AA5DD206}" type="datetimeFigureOut">
               <a:rPr lang="cs-CZ" smtClean="0"/>
-              <a:t>17.01.2022</a:t>
+              <a:t>18.01.2022</a:t>
             </a:fld>
             <a:endParaRPr lang="cs-CZ"/>
           </a:p>
@@ -862,7 +867,7 @@
           <a:p>
             <a:fld id="{C4EE0309-0ACD-46C5-9331-0350AA5DD206}" type="datetimeFigureOut">
               <a:rPr lang="cs-CZ" smtClean="0"/>
-              <a:t>17.01.2022</a:t>
+              <a:t>18.01.2022</a:t>
             </a:fld>
             <a:endParaRPr lang="cs-CZ"/>
           </a:p>
@@ -1137,7 +1142,7 @@
           <a:p>
             <a:fld id="{C4EE0309-0ACD-46C5-9331-0350AA5DD206}" type="datetimeFigureOut">
               <a:rPr lang="cs-CZ" smtClean="0"/>
-              <a:t>17.01.2022</a:t>
+              <a:t>18.01.2022</a:t>
             </a:fld>
             <a:endParaRPr lang="cs-CZ"/>
           </a:p>
@@ -1402,7 +1407,7 @@
           <a:p>
             <a:fld id="{C4EE0309-0ACD-46C5-9331-0350AA5DD206}" type="datetimeFigureOut">
               <a:rPr lang="cs-CZ" smtClean="0"/>
-              <a:t>17.01.2022</a:t>
+              <a:t>18.01.2022</a:t>
             </a:fld>
             <a:endParaRPr lang="cs-CZ"/>
           </a:p>
@@ -1814,7 +1819,7 @@
           <a:p>
             <a:fld id="{C4EE0309-0ACD-46C5-9331-0350AA5DD206}" type="datetimeFigureOut">
               <a:rPr lang="cs-CZ" smtClean="0"/>
-              <a:t>17.01.2022</a:t>
+              <a:t>18.01.2022</a:t>
             </a:fld>
             <a:endParaRPr lang="cs-CZ"/>
           </a:p>
@@ -1955,7 +1960,7 @@
           <a:p>
             <a:fld id="{C4EE0309-0ACD-46C5-9331-0350AA5DD206}" type="datetimeFigureOut">
               <a:rPr lang="cs-CZ" smtClean="0"/>
-              <a:t>17.01.2022</a:t>
+              <a:t>18.01.2022</a:t>
             </a:fld>
             <a:endParaRPr lang="cs-CZ"/>
           </a:p>
@@ -2068,7 +2073,7 @@
           <a:p>
             <a:fld id="{C4EE0309-0ACD-46C5-9331-0350AA5DD206}" type="datetimeFigureOut">
               <a:rPr lang="cs-CZ" smtClean="0"/>
-              <a:t>17.01.2022</a:t>
+              <a:t>18.01.2022</a:t>
             </a:fld>
             <a:endParaRPr lang="cs-CZ"/>
           </a:p>
@@ -2379,7 +2384,7 @@
           <a:p>
             <a:fld id="{C4EE0309-0ACD-46C5-9331-0350AA5DD206}" type="datetimeFigureOut">
               <a:rPr lang="cs-CZ" smtClean="0"/>
-              <a:t>17.01.2022</a:t>
+              <a:t>18.01.2022</a:t>
             </a:fld>
             <a:endParaRPr lang="cs-CZ"/>
           </a:p>
@@ -2667,7 +2672,7 @@
           <a:p>
             <a:fld id="{C4EE0309-0ACD-46C5-9331-0350AA5DD206}" type="datetimeFigureOut">
               <a:rPr lang="cs-CZ" smtClean="0"/>
-              <a:t>17.01.2022</a:t>
+              <a:t>18.01.2022</a:t>
             </a:fld>
             <a:endParaRPr lang="cs-CZ"/>
           </a:p>
@@ -2908,7 +2913,7 @@
           <a:p>
             <a:fld id="{C4EE0309-0ACD-46C5-9331-0350AA5DD206}" type="datetimeFigureOut">
               <a:rPr lang="cs-CZ" smtClean="0"/>
-              <a:t>17.01.2022</a:t>
+              <a:t>18.01.2022</a:t>
             </a:fld>
             <a:endParaRPr lang="cs-CZ"/>
           </a:p>

</xml_diff>